<commit_message>
added presentation version of powerpoint (less text)
</commit_message>
<xml_diff>
--- a/Data Visualization Challenge for Pres 2020 JLR.pptx
+++ b/Data Visualization Challenge for Pres 2020 JLR.pptx
@@ -6000,7 +6000,7 @@
           <a:p>
             <a:r>
               <a:rPr lang="en-US" dirty="0"/>
-              <a:t>Could also be done as percent reduction of original</a:t>
+              <a:t>Could also be done as percent reduction of original or money saved</a:t>
             </a:r>
           </a:p>
         </p:txBody>
@@ -6495,7 +6495,7 @@
         <p:spPr>
           <a:xfrm>
             <a:off x="388775" y="2237826"/>
-            <a:ext cx="3424335" cy="3046988"/>
+            <a:ext cx="3424335" cy="2308324"/>
           </a:xfrm>
           <a:prstGeom prst="rect">
             <a:avLst/>
@@ -6535,16 +6535,6 @@
             <a:r>
               <a:rPr lang="en-US" sz="2400" dirty="0"/>
               <a:t>Different time scales</a:t>
-            </a:r>
-          </a:p>
-          <a:p>
-            <a:pPr marL="285750" indent="-285750">
-              <a:buFont typeface="Arial" panose="020B0604020202020204" pitchFamily="34" charset="0"/>
-              <a:buChar char="•"/>
-            </a:pPr>
-            <a:r>
-              <a:rPr lang="en-US" sz="2400" dirty="0"/>
-              <a:t>Other percentiles of nearby buildings</a:t>
             </a:r>
           </a:p>
           <a:p>
@@ -7013,7 +7003,7 @@
         <p:spPr/>
         <p:txBody>
           <a:bodyPr>
-            <a:normAutofit fontScale="92500" lnSpcReduction="20000"/>
+            <a:normAutofit lnSpcReduction="10000"/>
           </a:bodyPr>
           <a:lstStyle/>
           <a:p>
@@ -7026,20 +7016,6 @@
             <a:r>
               <a:rPr lang="en-US" dirty="0"/>
               <a:t>Pie Chart of Total Volume Used</a:t>
-            </a:r>
-          </a:p>
-          <a:p>
-            <a:pPr lvl="1"/>
-            <a:r>
-              <a:rPr lang="en-US" dirty="0"/>
-              <a:t>With Irrigation</a:t>
-            </a:r>
-          </a:p>
-          <a:p>
-            <a:pPr lvl="1"/>
-            <a:r>
-              <a:rPr lang="en-US" dirty="0"/>
-              <a:t>Without Irrigation</a:t>
             </a:r>
           </a:p>
           <a:p>
@@ -7220,6 +7196,26 @@
             <a:r>
               <a:rPr lang="en-US" dirty="0"/>
               <a:t>Makes analysis difficult due to overpowering</a:t>
+            </a:r>
+          </a:p>
+          <a:p>
+            <a:r>
+              <a:rPr lang="en-US" dirty="0"/>
+              <a:t>Cost of water not considered, just volume</a:t>
+            </a:r>
+          </a:p>
+          <a:p>
+            <a:pPr lvl="1"/>
+            <a:r>
+              <a:rPr lang="en-US" dirty="0"/>
+              <a:t>Rates of water usage different in other areas</a:t>
+            </a:r>
+          </a:p>
+          <a:p>
+            <a:pPr lvl="1"/>
+            <a:r>
+              <a:rPr lang="en-US" dirty="0"/>
+              <a:t>Can change throughout time also</a:t>
             </a:r>
           </a:p>
           <a:p>

</xml_diff>